<commit_message>
slides4f start state for fast exp
</commit_message>
<xml_diff>
--- a/fall11/slidesF11/slides4f.pptx
+++ b/fall11/slidesF11/slides4f.pptx
@@ -10744,7 +10744,7 @@
           <a:graphicData uri="http://schemas.openxmlformats.org/presentationml/2006/ole">
             <mc:AlternateContent xmlns:mc="http://schemas.openxmlformats.org/markup-compatibility/2006">
               <mc:Choice xmlns:v="urn:schemas-microsoft-com:vml" Requires="v">
-                <p:oleObj spid="_x0000_s34825" name="Equation" r:id="rId4" imgW="1828800" imgH="241300" progId="Equation.DSMT4">
+                <p:oleObj spid="_x0000_s34828" name="Equation" r:id="rId4" imgW="1828800" imgH="241300" progId="Equation.DSMT4">
                   <p:embed/>
                 </p:oleObj>
               </mc:Choice>
@@ -24908,7 +24908,7 @@
           <a:graphicData uri="http://schemas.openxmlformats.org/presentationml/2006/ole">
             <mc:AlternateContent xmlns:mc="http://schemas.openxmlformats.org/markup-compatibility/2006">
               <mc:Choice xmlns:v="urn:schemas-microsoft-com:vml" Requires="v">
-                <p:oleObj spid="_x0000_s81929" name="Equation" r:id="rId4" imgW="1828800" imgH="241300" progId="Equation.DSMT4">
+                <p:oleObj spid="_x0000_s81932" name="Equation" r:id="rId4" imgW="1828800" imgH="241300" progId="Equation.DSMT4">
                   <p:embed/>
                 </p:oleObj>
               </mc:Choice>
@@ -33078,13 +33078,13 @@
   <p:clrMapOvr>
     <a:masterClrMapping/>
   </p:clrMapOvr>
-  <mc:AlternateContent xmlns:mc="http://schemas.openxmlformats.org/markup-compatibility/2006">
-    <mc:Choice xmlns:p14="http://schemas.microsoft.com/office/powerpoint/2010/main" Requires="p14">
+  <mc:AlternateContent xmlns:mc="http://schemas.openxmlformats.org/markup-compatibility/2006" xmlns:p14="http://schemas.microsoft.com/office/powerpoint/2010/main">
+    <mc:Choice Requires="p14">
       <p:transition spd="med" p14:dur="700">
         <p:fade thruBlk="1"/>
       </p:transition>
     </mc:Choice>
-    <mc:Fallback>
+    <mc:Fallback xmlns="">
       <p:transition xmlns:p14="http://schemas.microsoft.com/office/powerpoint/2010/main" spd="med">
         <p:fade thruBlk="1"/>
       </p:transition>
@@ -34133,7 +34133,7 @@
           <a:graphicData uri="http://schemas.openxmlformats.org/presentationml/2006/ole">
             <mc:AlternateContent xmlns:mc="http://schemas.openxmlformats.org/markup-compatibility/2006">
               <mc:Choice xmlns:v="urn:schemas-microsoft-com:vml" Requires="v">
-                <p:oleObj spid="_x0000_s56330" name="Equation" r:id="rId4" imgW="698500" imgH="165100" progId="Equation.DSMT4">
+                <p:oleObj spid="_x0000_s56333" name="Equation" r:id="rId4" imgW="698500" imgH="165100" progId="Equation.DSMT4">
                   <p:embed/>
                 </p:oleObj>
               </mc:Choice>
@@ -35446,7 +35446,7 @@
         </p:nvSpPr>
         <p:spPr bwMode="auto">
           <a:xfrm>
-            <a:off x="228600" y="1371600"/>
+            <a:off x="228600" y="1447800"/>
             <a:ext cx="8686800" cy="4038600"/>
           </a:xfrm>
           <a:noFill/>
@@ -35470,29 +35470,29 @@
               </a:spcBef>
             </a:pPr>
             <a:r>
-              <a:rPr lang="en-US" dirty="0" smtClean="0"/>
+              <a:rPr lang="en-US" sz="4400" dirty="0" smtClean="0"/>
               <a:t>preserved invariant: </a:t>
             </a:r>
             <a:r>
-              <a:rPr lang="en-US" sz="5400" dirty="0" smtClean="0">
+              <a:rPr lang="en-US" sz="6000" dirty="0" smtClean="0">
                 <a:latin typeface="Courier New"/>
                 <a:cs typeface="Courier New"/>
               </a:rPr>
               <a:t>YX</a:t>
             </a:r>
             <a:r>
-              <a:rPr lang="en-US" sz="5400" baseline="30000" dirty="0" smtClean="0">
+              <a:rPr lang="en-US" sz="6000" baseline="30000" dirty="0" smtClean="0">
                 <a:latin typeface="Courier New"/>
                 <a:cs typeface="Courier New"/>
               </a:rPr>
               <a:t>Z</a:t>
             </a:r>
             <a:r>
-              <a:rPr lang="en-US" sz="5400" dirty="0" smtClean="0"/>
+              <a:rPr lang="en-US" sz="6000" dirty="0" smtClean="0"/>
               <a:t> = </a:t>
             </a:r>
             <a:r>
-              <a:rPr lang="en-US" sz="5400" dirty="0" err="1" smtClean="0">
+              <a:rPr lang="en-US" sz="6000" dirty="0" err="1" smtClean="0">
                 <a:solidFill>
                   <a:srgbClr val="0000FF"/>
                 </a:solidFill>
@@ -35500,16 +35500,44 @@
               <a:t>a</a:t>
             </a:r>
             <a:r>
-              <a:rPr lang="en-US" sz="6000" baseline="30000" dirty="0" err="1" smtClean="0">
+              <a:rPr lang="en-US" sz="6600" baseline="30000" dirty="0" err="1" smtClean="0">
                 <a:solidFill>
                   <a:srgbClr val="0000FF"/>
                 </a:solidFill>
               </a:rPr>
               <a:t>b</a:t>
             </a:r>
+            <a:endParaRPr lang="en-US" sz="6600" baseline="30000" dirty="0" smtClean="0">
+              <a:solidFill>
+                <a:srgbClr val="0000FF"/>
+              </a:solidFill>
+            </a:endParaRPr>
+          </a:p>
+          <a:p>
+            <a:pPr marL="304800" indent="-304800" eaLnBrk="1" hangingPunct="1">
+              <a:spcBef>
+                <a:spcPct val="0"/>
+              </a:spcBef>
+            </a:pPr>
+            <a:r>
+              <a:rPr lang="en-US" sz="4800" dirty="0" smtClean="0">
+                <a:solidFill>
+                  <a:srgbClr val="000000"/>
+                </a:solidFill>
+              </a:rPr>
+              <a:t>at start</a:t>
+            </a:r>
+            <a:r>
+              <a:rPr lang="en-US" sz="6000" baseline="30000" dirty="0" smtClean="0">
+                <a:solidFill>
+                  <a:srgbClr val="0000FF"/>
+                </a:solidFill>
+              </a:rPr>
+              <a:t> </a:t>
+            </a:r>
             <a:endParaRPr lang="en-US" sz="6000" dirty="0" smtClean="0">
               <a:solidFill>
-                <a:srgbClr val="0000FF"/>
+                <a:srgbClr val="000000"/>
               </a:solidFill>
             </a:endParaRPr>
           </a:p>
@@ -35600,7 +35628,7 @@
           <p:nvPr/>
         </p:nvPicPr>
         <p:blipFill>
-          <a:blip r:embed="rId2"/>
+          <a:blip r:embed="rId3"/>
           <a:srcRect/>
           <a:stretch>
             <a:fillRect/>
@@ -35727,7 +35755,7 @@
           <p:nvPr/>
         </p:nvPicPr>
         <p:blipFill>
-          <a:blip r:embed="rId3" cstate="print"/>
+          <a:blip r:embed="rId4" cstate="print"/>
           <a:srcRect/>
           <a:stretch>
             <a:fillRect/>
@@ -35735,7 +35763,7 @@
         </p:blipFill>
         <p:spPr bwMode="auto">
           <a:xfrm>
-            <a:off x="7391400" y="3276600"/>
+            <a:off x="7086600" y="4051300"/>
             <a:ext cx="1289050" cy="977900"/>
           </a:xfrm>
           <a:prstGeom prst="rect">
@@ -35750,18 +35778,107 @@
           </a:ln>
         </p:spPr>
       </p:pic>
+      <p:graphicFrame>
+        <p:nvGraphicFramePr>
+          <p:cNvPr id="2" name="Object 1"/>
+          <p:cNvGraphicFramePr>
+            <a:graphicFrameLocks noChangeAspect="1"/>
+          </p:cNvGraphicFramePr>
+          <p:nvPr>
+            <p:extLst>
+              <p:ext uri="{D42A27DB-BD31-4B8C-83A1-F6EECF244321}">
+                <p14:modId xmlns:p14="http://schemas.microsoft.com/office/powerpoint/2010/main" val="1172902526"/>
+              </p:ext>
+            </p:extLst>
+          </p:nvPr>
+        </p:nvGraphicFramePr>
+        <p:xfrm>
+          <a:off x="2895600" y="2286000"/>
+          <a:ext cx="2641597" cy="914400"/>
+        </p:xfrm>
+        <a:graphic>
+          <a:graphicData uri="http://schemas.openxmlformats.org/presentationml/2006/ole">
+            <mc:AlternateContent xmlns:mc="http://schemas.openxmlformats.org/markup-compatibility/2006">
+              <mc:Choice xmlns:v="urn:schemas-microsoft-com:vml" Requires="v">
+                <p:oleObj spid="_x0000_s1026" name="Equation" r:id="rId5" imgW="660400" imgH="228600" progId="Equation.DSMT4">
+                  <p:embed/>
+                </p:oleObj>
+              </mc:Choice>
+              <mc:Fallback>
+                <p:oleObj name="Equation" r:id="rId5" imgW="660400" imgH="228600" progId="Equation.DSMT4">
+                  <p:embed/>
+                  <p:pic>
+                    <p:nvPicPr>
+                      <p:cNvPr id="0" name=""/>
+                      <p:cNvPicPr/>
+                      <p:nvPr/>
+                    </p:nvPicPr>
+                    <p:blipFill>
+                      <a:blip r:embed="rId6"/>
+                      <a:stretch>
+                        <a:fillRect/>
+                      </a:stretch>
+                    </p:blipFill>
+                    <p:spPr>
+                      <a:xfrm>
+                        <a:off x="2895600" y="2286000"/>
+                        <a:ext cx="2641597" cy="914400"/>
+                      </a:xfrm>
+                      <a:prstGeom prst="rect">
+                        <a:avLst/>
+                      </a:prstGeom>
+                    </p:spPr>
+                  </p:pic>
+                </p:oleObj>
+              </mc:Fallback>
+            </mc:AlternateContent>
+          </a:graphicData>
+        </a:graphic>
+      </p:graphicFrame>
+      <p:pic>
+        <p:nvPicPr>
+          <p:cNvPr id="9" name="Picture 7" descr="MCj01051920000[1]"/>
+          <p:cNvPicPr>
+            <a:picLocks noChangeAspect="1" noChangeArrowheads="1"/>
+          </p:cNvPicPr>
+          <p:nvPr/>
+        </p:nvPicPr>
+        <p:blipFill>
+          <a:blip r:embed="rId4" cstate="print"/>
+          <a:srcRect/>
+          <a:stretch>
+            <a:fillRect/>
+          </a:stretch>
+        </p:blipFill>
+        <p:spPr bwMode="auto">
+          <a:xfrm>
+            <a:off x="5715000" y="2222500"/>
+            <a:ext cx="1289050" cy="977900"/>
+          </a:xfrm>
+          <a:prstGeom prst="rect">
+            <a:avLst/>
+          </a:prstGeom>
+          <a:noFill/>
+          <a:ln w="9525">
+            <a:noFill/>
+            <a:miter lim="800000"/>
+            <a:headEnd/>
+            <a:tailEnd/>
+          </a:ln>
+        </p:spPr>
+      </p:pic>
     </p:spTree>
   </p:cSld>
   <p:clrMapOvr>
     <a:masterClrMapping/>
   </p:clrMapOvr>
-  <mc:AlternateContent xmlns:mc="http://schemas.openxmlformats.org/markup-compatibility/2006">
-    <mc:Choice xmlns:p14="http://schemas.microsoft.com/office/powerpoint/2010/main" Requires="p14">
+  <mc:AlternateContent xmlns:mc="http://schemas.openxmlformats.org/markup-compatibility/2006" xmlns:p14="http://schemas.microsoft.com/office/powerpoint/2010/main">
+    <mc:Choice Requires="p14">
       <p:transition spd="med" p14:dur="700">
         <p:fade/>
       </p:transition>
     </mc:Choice>
-    <mc:Fallback>
+    <mc:Fallback xmlns="">
       <p:transition xmlns:p14="http://schemas.microsoft.com/office/powerpoint/2010/main" spd="med">
         <p:fade/>
       </p:transition>
@@ -35788,7 +35905,7 @@
                             </p:stCondLst>
                             <p:childTnLst>
                               <p:par>
-                                <p:cTn id="5" presetID="1" presetClass="entr" presetSubtype="0" fill="hold" grpId="0" nodeType="clickEffect">
+                                <p:cTn id="5" presetID="9" presetClass="entr" presetSubtype="0" fill="hold" nodeType="clickEffect">
                                   <p:stCondLst>
                                     <p:cond delay="0"/>
                                   </p:stCondLst>
@@ -35797,56 +35914,7 @@
                                       <p:cBhvr>
                                         <p:cTn id="6" dur="1" fill="hold">
                                           <p:stCondLst>
-                                            <p:cond delay="499"/>
-                                          </p:stCondLst>
-                                        </p:cTn>
-                                        <p:tgtEl>
-                                          <p:spTgt spid="37893">
-                                            <p:txEl>
-                                              <p:pRg st="0" end="0"/>
-                                            </p:txEl>
-                                          </p:spTgt>
-                                        </p:tgtEl>
-                                        <p:attrNameLst>
-                                          <p:attrName>style.visibility</p:attrName>
-                                        </p:attrNameLst>
-                                      </p:cBhvr>
-                                      <p:to>
-                                        <p:strVal val="visible"/>
-                                      </p:to>
-                                    </p:set>
-                                  </p:childTnLst>
-                                </p:cTn>
-                              </p:par>
-                            </p:childTnLst>
-                          </p:cTn>
-                        </p:par>
-                      </p:childTnLst>
-                    </p:cTn>
-                  </p:par>
-                  <p:par>
-                    <p:cTn id="7" fill="hold">
-                      <p:stCondLst>
-                        <p:cond delay="indefinite"/>
-                      </p:stCondLst>
-                      <p:childTnLst>
-                        <p:par>
-                          <p:cTn id="8" fill="hold">
-                            <p:stCondLst>
-                              <p:cond delay="0"/>
-                            </p:stCondLst>
-                            <p:childTnLst>
-                              <p:par>
-                                <p:cTn id="9" presetID="1" presetClass="entr" presetSubtype="0" fill="hold" grpId="0" nodeType="clickEffect">
-                                  <p:stCondLst>
-                                    <p:cond delay="0"/>
-                                  </p:stCondLst>
-                                  <p:childTnLst>
-                                    <p:set>
-                                      <p:cBhvr>
-                                        <p:cTn id="10" dur="1" fill="hold">
-                                          <p:stCondLst>
-                                            <p:cond delay="499"/>
+                                            <p:cond delay="0"/>
                                           </p:stCondLst>
                                         </p:cTn>
                                         <p:tgtEl>
@@ -35864,6 +35932,62 @@
                                         <p:strVal val="visible"/>
                                       </p:to>
                                     </p:set>
+                                    <p:animEffect transition="in" filter="dissolve">
+                                      <p:cBhvr>
+                                        <p:cTn id="7" dur="500"/>
+                                        <p:tgtEl>
+                                          <p:spTgt spid="37893">
+                                            <p:txEl>
+                                              <p:pRg st="1" end="1"/>
+                                            </p:txEl>
+                                          </p:spTgt>
+                                        </p:tgtEl>
+                                      </p:cBhvr>
+                                    </p:animEffect>
+                                  </p:childTnLst>
+                                </p:cTn>
+                              </p:par>
+                            </p:childTnLst>
+                          </p:cTn>
+                        </p:par>
+                        <p:par>
+                          <p:cTn id="8" fill="hold">
+                            <p:stCondLst>
+                              <p:cond delay="500"/>
+                            </p:stCondLst>
+                            <p:childTnLst>
+                              <p:par>
+                                <p:cTn id="9" presetID="22" presetClass="entr" presetSubtype="8" fill="hold" nodeType="afterEffect">
+                                  <p:stCondLst>
+                                    <p:cond delay="0"/>
+                                  </p:stCondLst>
+                                  <p:childTnLst>
+                                    <p:set>
+                                      <p:cBhvr>
+                                        <p:cTn id="10" dur="1" fill="hold">
+                                          <p:stCondLst>
+                                            <p:cond delay="0"/>
+                                          </p:stCondLst>
+                                        </p:cTn>
+                                        <p:tgtEl>
+                                          <p:spTgt spid="2"/>
+                                        </p:tgtEl>
+                                        <p:attrNameLst>
+                                          <p:attrName>style.visibility</p:attrName>
+                                        </p:attrNameLst>
+                                      </p:cBhvr>
+                                      <p:to>
+                                        <p:strVal val="visible"/>
+                                      </p:to>
+                                    </p:set>
+                                    <p:animEffect transition="in" filter="wipe(left)">
+                                      <p:cBhvr>
+                                        <p:cTn id="11" dur="500"/>
+                                        <p:tgtEl>
+                                          <p:spTgt spid="2"/>
+                                        </p:tgtEl>
+                                      </p:cBhvr>
+                                    </p:animEffect>
                                   </p:childTnLst>
                                 </p:cTn>
                               </p:par>
@@ -35874,81 +35998,32 @@
                     </p:cTn>
                   </p:par>
                   <p:par>
-                    <p:cTn id="11" fill="hold">
+                    <p:cTn id="12" fill="hold">
                       <p:stCondLst>
                         <p:cond delay="indefinite"/>
                       </p:stCondLst>
                       <p:childTnLst>
                         <p:par>
-                          <p:cTn id="12" fill="hold">
+                          <p:cTn id="13" fill="hold">
                             <p:stCondLst>
                               <p:cond delay="0"/>
                             </p:stCondLst>
                             <p:childTnLst>
                               <p:par>
-                                <p:cTn id="13" presetID="1" presetClass="entr" presetSubtype="0" fill="hold" grpId="0" nodeType="clickEffect">
+                                <p:cTn id="14" presetID="2" presetClass="entr" presetSubtype="2" fill="hold" nodeType="clickEffect">
                                   <p:stCondLst>
                                     <p:cond delay="0"/>
                                   </p:stCondLst>
                                   <p:childTnLst>
                                     <p:set>
                                       <p:cBhvr>
-                                        <p:cTn id="14" dur="1" fill="hold">
-                                          <p:stCondLst>
-                                            <p:cond delay="499"/>
-                                          </p:stCondLst>
-                                        </p:cTn>
-                                        <p:tgtEl>
-                                          <p:spTgt spid="37893">
-                                            <p:txEl>
-                                              <p:pRg st="2" end="2"/>
-                                            </p:txEl>
-                                          </p:spTgt>
-                                        </p:tgtEl>
-                                        <p:attrNameLst>
-                                          <p:attrName>style.visibility</p:attrName>
-                                        </p:attrNameLst>
-                                      </p:cBhvr>
-                                      <p:to>
-                                        <p:strVal val="visible"/>
-                                      </p:to>
-                                    </p:set>
-                                  </p:childTnLst>
-                                </p:cTn>
-                              </p:par>
-                            </p:childTnLst>
-                          </p:cTn>
-                        </p:par>
-                      </p:childTnLst>
-                    </p:cTn>
-                  </p:par>
-                  <p:par>
-                    <p:cTn id="15" fill="hold">
-                      <p:stCondLst>
-                        <p:cond delay="indefinite"/>
-                      </p:stCondLst>
-                      <p:childTnLst>
-                        <p:par>
-                          <p:cTn id="16" fill="hold">
-                            <p:stCondLst>
-                              <p:cond delay="0"/>
-                            </p:stCondLst>
-                            <p:childTnLst>
-                              <p:par>
-                                <p:cTn id="17" presetID="2" presetClass="entr" presetSubtype="3" fill="hold" nodeType="clickEffect">
-                                  <p:stCondLst>
-                                    <p:cond delay="0"/>
-                                  </p:stCondLst>
-                                  <p:childTnLst>
-                                    <p:set>
-                                      <p:cBhvr>
-                                        <p:cTn id="18" dur="1" fill="hold">
+                                        <p:cTn id="15" dur="1" fill="hold">
                                           <p:stCondLst>
                                             <p:cond delay="0"/>
                                           </p:stCondLst>
                                         </p:cTn>
                                         <p:tgtEl>
-                                          <p:spTgt spid="6"/>
+                                          <p:spTgt spid="9"/>
                                         </p:tgtEl>
                                         <p:attrNameLst>
                                           <p:attrName>style.visibility</p:attrName>
@@ -35960,9 +36035,9 @@
                                     </p:set>
                                     <p:anim calcmode="lin" valueType="num">
                                       <p:cBhvr additive="base">
-                                        <p:cTn id="19" dur="500" fill="hold"/>
+                                        <p:cTn id="16" dur="500" fill="hold"/>
                                         <p:tgtEl>
-                                          <p:spTgt spid="6"/>
+                                          <p:spTgt spid="9"/>
                                         </p:tgtEl>
                                         <p:attrNameLst>
                                           <p:attrName>ppt_x</p:attrName>
@@ -35983,7 +36058,202 @@
                                     </p:anim>
                                     <p:anim calcmode="lin" valueType="num">
                                       <p:cBhvr additive="base">
-                                        <p:cTn id="20" dur="500" fill="hold"/>
+                                        <p:cTn id="17" dur="500" fill="hold"/>
+                                        <p:tgtEl>
+                                          <p:spTgt spid="9"/>
+                                        </p:tgtEl>
+                                        <p:attrNameLst>
+                                          <p:attrName>ppt_y</p:attrName>
+                                        </p:attrNameLst>
+                                      </p:cBhvr>
+                                      <p:tavLst>
+                                        <p:tav tm="0">
+                                          <p:val>
+                                            <p:strVal val="#ppt_y"/>
+                                          </p:val>
+                                        </p:tav>
+                                        <p:tav tm="100000">
+                                          <p:val>
+                                            <p:strVal val="#ppt_y"/>
+                                          </p:val>
+                                        </p:tav>
+                                      </p:tavLst>
+                                    </p:anim>
+                                  </p:childTnLst>
+                                </p:cTn>
+                              </p:par>
+                            </p:childTnLst>
+                          </p:cTn>
+                        </p:par>
+                      </p:childTnLst>
+                    </p:cTn>
+                  </p:par>
+                  <p:par>
+                    <p:cTn id="18" fill="hold">
+                      <p:stCondLst>
+                        <p:cond delay="indefinite"/>
+                      </p:stCondLst>
+                      <p:childTnLst>
+                        <p:par>
+                          <p:cTn id="19" fill="hold">
+                            <p:stCondLst>
+                              <p:cond delay="0"/>
+                            </p:stCondLst>
+                            <p:childTnLst>
+                              <p:par>
+                                <p:cTn id="20" presetID="9" presetClass="entr" presetSubtype="0" fill="hold" nodeType="clickEffect">
+                                  <p:stCondLst>
+                                    <p:cond delay="0"/>
+                                  </p:stCondLst>
+                                  <p:childTnLst>
+                                    <p:set>
+                                      <p:cBhvr>
+                                        <p:cTn id="21" dur="1" fill="hold">
+                                          <p:stCondLst>
+                                            <p:cond delay="0"/>
+                                          </p:stCondLst>
+                                        </p:cTn>
+                                        <p:tgtEl>
+                                          <p:spTgt spid="37893">
+                                            <p:txEl>
+                                              <p:pRg st="2" end="2"/>
+                                            </p:txEl>
+                                          </p:spTgt>
+                                        </p:tgtEl>
+                                        <p:attrNameLst>
+                                          <p:attrName>style.visibility</p:attrName>
+                                        </p:attrNameLst>
+                                      </p:cBhvr>
+                                      <p:to>
+                                        <p:strVal val="visible"/>
+                                      </p:to>
+                                    </p:set>
+                                    <p:animEffect transition="in" filter="dissolve">
+                                      <p:cBhvr>
+                                        <p:cTn id="22" dur="500"/>
+                                        <p:tgtEl>
+                                          <p:spTgt spid="37893">
+                                            <p:txEl>
+                                              <p:pRg st="2" end="2"/>
+                                            </p:txEl>
+                                          </p:spTgt>
+                                        </p:tgtEl>
+                                      </p:cBhvr>
+                                    </p:animEffect>
+                                  </p:childTnLst>
+                                </p:cTn>
+                              </p:par>
+                              <p:par>
+                                <p:cTn id="23" presetID="9" presetClass="entr" presetSubtype="0" fill="hold" nodeType="withEffect">
+                                  <p:stCondLst>
+                                    <p:cond delay="0"/>
+                                  </p:stCondLst>
+                                  <p:childTnLst>
+                                    <p:set>
+                                      <p:cBhvr>
+                                        <p:cTn id="24" dur="1" fill="hold">
+                                          <p:stCondLst>
+                                            <p:cond delay="0"/>
+                                          </p:stCondLst>
+                                        </p:cTn>
+                                        <p:tgtEl>
+                                          <p:spTgt spid="37893">
+                                            <p:txEl>
+                                              <p:pRg st="3" end="3"/>
+                                            </p:txEl>
+                                          </p:spTgt>
+                                        </p:tgtEl>
+                                        <p:attrNameLst>
+                                          <p:attrName>style.visibility</p:attrName>
+                                        </p:attrNameLst>
+                                      </p:cBhvr>
+                                      <p:to>
+                                        <p:strVal val="visible"/>
+                                      </p:to>
+                                    </p:set>
+                                    <p:animEffect transition="in" filter="dissolve">
+                                      <p:cBhvr>
+                                        <p:cTn id="25" dur="500"/>
+                                        <p:tgtEl>
+                                          <p:spTgt spid="37893">
+                                            <p:txEl>
+                                              <p:pRg st="3" end="3"/>
+                                            </p:txEl>
+                                          </p:spTgt>
+                                        </p:tgtEl>
+                                      </p:cBhvr>
+                                    </p:animEffect>
+                                  </p:childTnLst>
+                                </p:cTn>
+                              </p:par>
+                            </p:childTnLst>
+                          </p:cTn>
+                        </p:par>
+                      </p:childTnLst>
+                    </p:cTn>
+                  </p:par>
+                  <p:par>
+                    <p:cTn id="26" fill="hold">
+                      <p:stCondLst>
+                        <p:cond delay="indefinite"/>
+                      </p:stCondLst>
+                      <p:childTnLst>
+                        <p:par>
+                          <p:cTn id="27" fill="hold">
+                            <p:stCondLst>
+                              <p:cond delay="0"/>
+                            </p:stCondLst>
+                            <p:childTnLst>
+                              <p:par>
+                                <p:cTn id="28" presetID="2" presetClass="entr" presetSubtype="4" fill="hold" nodeType="clickEffect">
+                                  <p:stCondLst>
+                                    <p:cond delay="0"/>
+                                  </p:stCondLst>
+                                  <p:childTnLst>
+                                    <p:set>
+                                      <p:cBhvr>
+                                        <p:cTn id="29" dur="1" fill="hold">
+                                          <p:stCondLst>
+                                            <p:cond delay="0"/>
+                                          </p:stCondLst>
+                                        </p:cTn>
+                                        <p:tgtEl>
+                                          <p:spTgt spid="6"/>
+                                        </p:tgtEl>
+                                        <p:attrNameLst>
+                                          <p:attrName>style.visibility</p:attrName>
+                                        </p:attrNameLst>
+                                      </p:cBhvr>
+                                      <p:to>
+                                        <p:strVal val="visible"/>
+                                      </p:to>
+                                    </p:set>
+                                    <p:anim calcmode="lin" valueType="num">
+                                      <p:cBhvr additive="base">
+                                        <p:cTn id="30" dur="500" fill="hold"/>
+                                        <p:tgtEl>
+                                          <p:spTgt spid="6"/>
+                                        </p:tgtEl>
+                                        <p:attrNameLst>
+                                          <p:attrName>ppt_x</p:attrName>
+                                        </p:attrNameLst>
+                                      </p:cBhvr>
+                                      <p:tavLst>
+                                        <p:tav tm="0">
+                                          <p:val>
+                                            <p:strVal val="#ppt_x"/>
+                                          </p:val>
+                                        </p:tav>
+                                        <p:tav tm="100000">
+                                          <p:val>
+                                            <p:strVal val="#ppt_x"/>
+                                          </p:val>
+                                        </p:tav>
+                                      </p:tavLst>
+                                    </p:anim>
+                                    <p:anim calcmode="lin" valueType="num">
+                                      <p:cBhvr additive="base">
+                                        <p:cTn id="31" dur="500" fill="hold"/>
                                         <p:tgtEl>
                                           <p:spTgt spid="6"/>
                                         </p:tgtEl>
@@ -35994,7 +36264,7 @@
                                       <p:tavLst>
                                         <p:tav tm="0">
                                           <p:val>
-                                            <p:strVal val="0-#ppt_h/2"/>
+                                            <p:strVal val="1+#ppt_h/2"/>
                                           </p:val>
                                         </p:tav>
                                         <p:tav tm="100000">
@@ -36034,9 +36304,6 @@
         </p:cTn>
       </p:par>
     </p:tnLst>
-    <p:bldLst>
-      <p:bldP spid="37893" grpId="0" build="p" autoUpdateAnimBg="0"/>
-    </p:bldLst>
   </p:timing>
 </p:sld>
 </file>

</xml_diff>